<commit_message>
some small updates to Session09
</commit_message>
<xml_diff>
--- a/Session09/Session9_Slides.pptx
+++ b/Session09/Session9_Slides.pptx
@@ -10616,7 +10616,7 @@
           </a:ln>
           <a:extLst>
             <a:ext uri="{C572A759-6A51-4108-AA02-DFA0A04FC94B}">
-              <ma14:wrappingTextBoxFlag xmlns:ma14="http://schemas.microsoft.com/office/mac/drawingml/2011/main" xmlns="" val="1"/>
+              <ma14:wrappingTextBoxFlag xmlns="" xmlns:ma14="http://schemas.microsoft.com/office/mac/drawingml/2011/main" val="1"/>
             </a:ext>
           </a:extLst>
         </p:spPr>
@@ -10655,7 +10655,7 @@
           </a:ln>
           <a:extLst>
             <a:ext uri="{C572A759-6A51-4108-AA02-DFA0A04FC94B}">
-              <ma14:wrappingTextBoxFlag xmlns:ma14="http://schemas.microsoft.com/office/mac/drawingml/2011/main" xmlns="" val="1"/>
+              <ma14:wrappingTextBoxFlag xmlns="" xmlns:ma14="http://schemas.microsoft.com/office/mac/drawingml/2011/main" val="1"/>
             </a:ext>
           </a:extLst>
         </p:spPr>
@@ -11719,7 +11719,7 @@
           </a:ln>
           <a:extLst>
             <a:ext uri="{C572A759-6A51-4108-AA02-DFA0A04FC94B}">
-              <ma14:wrappingTextBoxFlag xmlns="" xmlns:ma14="http://schemas.microsoft.com/office/mac/drawingml/2011/main" val="1"/>
+              <ma14:wrappingTextBoxFlag xmlns:ma14="http://schemas.microsoft.com/office/mac/drawingml/2011/main" xmlns="" val="1"/>
             </a:ext>
           </a:extLst>
         </p:spPr>
@@ -11758,7 +11758,7 @@
           </a:ln>
           <a:extLst>
             <a:ext uri="{C572A759-6A51-4108-AA02-DFA0A04FC94B}">
-              <ma14:wrappingTextBoxFlag xmlns="" xmlns:ma14="http://schemas.microsoft.com/office/mac/drawingml/2011/main" val="1"/>
+              <ma14:wrappingTextBoxFlag xmlns:ma14="http://schemas.microsoft.com/office/mac/drawingml/2011/main" xmlns="" val="1"/>
             </a:ext>
           </a:extLst>
         </p:spPr>
@@ -12853,7 +12853,7 @@
           </a:ln>
           <a:extLst>
             <a:ext uri="{C572A759-6A51-4108-AA02-DFA0A04FC94B}">
-              <ma14:wrappingTextBoxFlag xmlns="" xmlns:ma14="http://schemas.microsoft.com/office/mac/drawingml/2011/main" val="1"/>
+              <ma14:wrappingTextBoxFlag xmlns:ma14="http://schemas.microsoft.com/office/mac/drawingml/2011/main" xmlns="" val="1"/>
             </a:ext>
           </a:extLst>
         </p:spPr>
@@ -12964,7 +12964,7 @@
           </a:ln>
           <a:extLst>
             <a:ext uri="{C572A759-6A51-4108-AA02-DFA0A04FC94B}">
-              <ma14:wrappingTextBoxFlag xmlns="" xmlns:ma14="http://schemas.microsoft.com/office/mac/drawingml/2011/main" val="1"/>
+              <ma14:wrappingTextBoxFlag xmlns:ma14="http://schemas.microsoft.com/office/mac/drawingml/2011/main" xmlns="" val="1"/>
             </a:ext>
           </a:extLst>
         </p:spPr>
@@ -13199,7 +13199,7 @@
           </a:ln>
           <a:extLst>
             <a:ext uri="{C572A759-6A51-4108-AA02-DFA0A04FC94B}">
-              <ma14:wrappingTextBoxFlag xmlns="" xmlns:ma14="http://schemas.microsoft.com/office/mac/drawingml/2011/main" val="1"/>
+              <ma14:wrappingTextBoxFlag xmlns:ma14="http://schemas.microsoft.com/office/mac/drawingml/2011/main" xmlns="" val="1"/>
             </a:ext>
           </a:extLst>
         </p:spPr>
@@ -13261,7 +13261,7 @@
           </a:ln>
           <a:extLst>
             <a:ext uri="{C572A759-6A51-4108-AA02-DFA0A04FC94B}">
-              <ma14:wrappingTextBoxFlag xmlns="" xmlns:ma14="http://schemas.microsoft.com/office/mac/drawingml/2011/main" val="1"/>
+              <ma14:wrappingTextBoxFlag xmlns:ma14="http://schemas.microsoft.com/office/mac/drawingml/2011/main" xmlns="" val="1"/>
             </a:ext>
           </a:extLst>
         </p:spPr>
@@ -13328,7 +13328,7 @@
           </a:ln>
           <a:extLst>
             <a:ext uri="{C572A759-6A51-4108-AA02-DFA0A04FC94B}">
-              <ma14:wrappingTextBoxFlag xmlns="" xmlns:ma14="http://schemas.microsoft.com/office/mac/drawingml/2011/main" val="1"/>
+              <ma14:wrappingTextBoxFlag xmlns:ma14="http://schemas.microsoft.com/office/mac/drawingml/2011/main" xmlns="" val="1"/>
             </a:ext>
           </a:extLst>
         </p:spPr>
@@ -13395,7 +13395,7 @@
           </a:ln>
           <a:extLst>
             <a:ext uri="{C572A759-6A51-4108-AA02-DFA0A04FC94B}">
-              <ma14:wrappingTextBoxFlag xmlns="" xmlns:ma14="http://schemas.microsoft.com/office/mac/drawingml/2011/main" val="1"/>
+              <ma14:wrappingTextBoxFlag xmlns:ma14="http://schemas.microsoft.com/office/mac/drawingml/2011/main" xmlns="" val="1"/>
             </a:ext>
           </a:extLst>
         </p:spPr>
@@ -13524,7 +13524,7 @@
           </a:ln>
           <a:extLst>
             <a:ext uri="{C572A759-6A51-4108-AA02-DFA0A04FC94B}">
-              <ma14:wrappingTextBoxFlag xmlns="" xmlns:ma14="http://schemas.microsoft.com/office/mac/drawingml/2011/main" val="1"/>
+              <ma14:wrappingTextBoxFlag xmlns:ma14="http://schemas.microsoft.com/office/mac/drawingml/2011/main" xmlns="" val="1"/>
             </a:ext>
           </a:extLst>
         </p:spPr>
@@ -14427,7 +14427,7 @@
         </p:spPr>
         <p:txBody>
           <a:bodyPr>
-            <a:normAutofit fontScale="90000"/>
+            <a:normAutofit/>
           </a:bodyPr>
           <a:lstStyle>
             <a:lvl1pPr defTabSz="403097">
@@ -15169,7 +15169,7 @@
 </file>
 
 <file path=ppt/slides/slide21.xml><?xml version="1.0" encoding="utf-8"?>
-<p:sld xmlns:a="http://schemas.openxmlformats.org/drawingml/2006/main" xmlns:r="http://schemas.openxmlformats.org/officeDocument/2006/relationships" xmlns:p="http://schemas.openxmlformats.org/presentationml/2006/main">
+<p:sld xmlns:a="http://schemas.openxmlformats.org/drawingml/2006/main" xmlns:r="http://schemas.openxmlformats.org/officeDocument/2006/relationships" xmlns:p="http://schemas.openxmlformats.org/presentationml/2006/main" show="0">
   <p:cSld>
     <p:spTree>
       <p:nvGrpSpPr>
@@ -15290,7 +15290,7 @@
 </file>
 
 <file path=ppt/slides/slide22.xml><?xml version="1.0" encoding="utf-8"?>
-<p:sld xmlns:a="http://schemas.openxmlformats.org/drawingml/2006/main" xmlns:r="http://schemas.openxmlformats.org/officeDocument/2006/relationships" xmlns:p="http://schemas.openxmlformats.org/presentationml/2006/main">
+<p:sld xmlns:a="http://schemas.openxmlformats.org/drawingml/2006/main" xmlns:r="http://schemas.openxmlformats.org/officeDocument/2006/relationships" xmlns:p="http://schemas.openxmlformats.org/presentationml/2006/main" show="0">
   <p:cSld>
     <p:spTree>
       <p:nvGrpSpPr>
@@ -15420,7 +15420,7 @@
 </file>
 
 <file path=ppt/slides/slide23.xml><?xml version="1.0" encoding="utf-8"?>
-<p:sld xmlns:a="http://schemas.openxmlformats.org/drawingml/2006/main" xmlns:r="http://schemas.openxmlformats.org/officeDocument/2006/relationships" xmlns:p="http://schemas.openxmlformats.org/presentationml/2006/main">
+<p:sld xmlns:a="http://schemas.openxmlformats.org/drawingml/2006/main" xmlns:r="http://schemas.openxmlformats.org/officeDocument/2006/relationships" xmlns:p="http://schemas.openxmlformats.org/presentationml/2006/main" show="0">
   <p:cSld>
     <p:spTree>
       <p:nvGrpSpPr>
@@ -15544,7 +15544,7 @@
           </a:ln>
           <a:extLst>
             <a:ext uri="{C572A759-6A51-4108-AA02-DFA0A04FC94B}">
-              <ma14:wrappingTextBoxFlag xmlns="" xmlns:ma14="http://schemas.microsoft.com/office/mac/drawingml/2011/main" val="1"/>
+              <ma14:wrappingTextBoxFlag xmlns:ma14="http://schemas.microsoft.com/office/mac/drawingml/2011/main" xmlns="" val="1"/>
             </a:ext>
           </a:extLst>
         </p:spPr>
@@ -15832,7 +15832,7 @@
           <a:p>
             <a:r>
               <a:rPr lang="en-US" dirty="0"/>
-              <a:t>Compares model’s error to error against average</a:t>
+              <a:t>Compares model’s error to deviations from the  average</a:t>
             </a:r>
           </a:p>
           <a:p>
@@ -15953,8 +15953,8 @@
           </a:p>
         </p:txBody>
       </p:sp>
-      <mc:AlternateContent xmlns:mc="http://schemas.openxmlformats.org/markup-compatibility/2006" xmlns:a14="http://schemas.microsoft.com/office/drawing/2010/main">
-        <mc:Choice Requires="a14">
+      <mc:AlternateContent xmlns:mc="http://schemas.openxmlformats.org/markup-compatibility/2006">
+        <mc:Choice xmlns:a14="http://schemas.microsoft.com/office/drawing/2010/main" Requires="a14">
           <p:sp>
             <p:nvSpPr>
               <p:cNvPr id="2" name="Text Placeholder 1">
@@ -15991,7 +15991,13 @@
                         <a:rPr lang="en-US" sz="3800" b="0" i="1" smtClean="0">
                           <a:latin typeface="Cambria Math" panose="02040503050406030204" pitchFamily="18" charset="0"/>
                         </a:rPr>
-                        <m:t>𝑆𝑆𝑇</m:t>
+                        <m:t>𝑆𝑆</m:t>
+                      </m:r>
+                      <m:r>
+                        <a:rPr lang="en-US" sz="3800" b="0" i="1" smtClean="0">
+                          <a:latin typeface="Cambria Math" panose="02040503050406030204" pitchFamily="18" charset="0"/>
+                        </a:rPr>
+                        <m:t>𝑇</m:t>
                       </m:r>
                       <m:r>
                         <a:rPr lang="en-US" sz="3800" b="0" i="1" smtClean="0">
@@ -16541,7 +16547,7 @@
             </p:txBody>
           </p:sp>
         </mc:Choice>
-        <mc:Fallback xmlns="">
+        <mc:Fallback>
           <p:sp>
             <p:nvSpPr>
               <p:cNvPr id="2" name="Text Placeholder 1">
@@ -16562,7 +16568,7 @@
               <a:blipFill>
                 <a:blip r:embed="rId2"/>
                 <a:stretch>
-                  <a:fillRect/>
+                  <a:fillRect l="-1873" t="-28515" b="-3366"/>
                 </a:stretch>
               </a:blipFill>
             </p:spPr>
@@ -16974,7 +16980,7 @@
         </p:spPr>
         <p:txBody>
           <a:bodyPr>
-            <a:normAutofit fontScale="90000"/>
+            <a:normAutofit/>
           </a:bodyPr>
           <a:lstStyle>
             <a:lvl1pPr defTabSz="403097">
@@ -17010,7 +17016,7 @@
           </a:ln>
           <a:extLst>
             <a:ext uri="{C572A759-6A51-4108-AA02-DFA0A04FC94B}">
-              <ma14:wrappingTextBoxFlag xmlns="" xmlns:ma14="http://schemas.microsoft.com/office/mac/drawingml/2011/main" val="1"/>
+              <ma14:wrappingTextBoxFlag xmlns:ma14="http://schemas.microsoft.com/office/mac/drawingml/2011/main" xmlns="" val="1"/>
             </a:ext>
           </a:extLst>
         </p:spPr>
@@ -17054,7 +17060,7 @@
           </a:ln>
           <a:extLst>
             <a:ext uri="{C572A759-6A51-4108-AA02-DFA0A04FC94B}">
-              <ma14:wrappingTextBoxFlag xmlns="" xmlns:ma14="http://schemas.microsoft.com/office/mac/drawingml/2011/main" val="1"/>
+              <ma14:wrappingTextBoxFlag xmlns:ma14="http://schemas.microsoft.com/office/mac/drawingml/2011/main" xmlns="" val="1"/>
             </a:ext>
           </a:extLst>
         </p:spPr>
@@ -17268,7 +17274,7 @@
           </a:ln>
           <a:extLst>
             <a:ext uri="{C572A759-6A51-4108-AA02-DFA0A04FC94B}">
-              <ma14:wrappingTextBoxFlag xmlns="" xmlns:ma14="http://schemas.microsoft.com/office/mac/drawingml/2011/main" val="1"/>
+              <ma14:wrappingTextBoxFlag xmlns:ma14="http://schemas.microsoft.com/office/mac/drawingml/2011/main" xmlns="" val="1"/>
             </a:ext>
           </a:extLst>
         </p:spPr>
@@ -17386,7 +17392,7 @@
           </a:ln>
           <a:extLst>
             <a:ext uri="{C572A759-6A51-4108-AA02-DFA0A04FC94B}">
-              <ma14:wrappingTextBoxFlag xmlns="" xmlns:ma14="http://schemas.microsoft.com/office/mac/drawingml/2011/main" val="1"/>
+              <ma14:wrappingTextBoxFlag xmlns:ma14="http://schemas.microsoft.com/office/mac/drawingml/2011/main" xmlns="" val="1"/>
             </a:ext>
           </a:extLst>
         </p:spPr>
@@ -17483,7 +17489,7 @@
         </p:spPr>
         <p:txBody>
           <a:bodyPr>
-            <a:normAutofit fontScale="90000"/>
+            <a:normAutofit/>
           </a:bodyPr>
           <a:lstStyle>
             <a:lvl1pPr defTabSz="455675">
@@ -17544,7 +17550,7 @@
         </p:spPr>
         <p:txBody>
           <a:bodyPr>
-            <a:normAutofit fontScale="90000"/>
+            <a:normAutofit/>
           </a:bodyPr>
           <a:lstStyle>
             <a:lvl1pPr defTabSz="403097">
@@ -17580,7 +17586,7 @@
           </a:ln>
           <a:extLst>
             <a:ext uri="{C572A759-6A51-4108-AA02-DFA0A04FC94B}">
-              <ma14:wrappingTextBoxFlag xmlns="" xmlns:ma14="http://schemas.microsoft.com/office/mac/drawingml/2011/main" val="1"/>
+              <ma14:wrappingTextBoxFlag xmlns:ma14="http://schemas.microsoft.com/office/mac/drawingml/2011/main" xmlns="" val="1"/>
             </a:ext>
           </a:extLst>
         </p:spPr>
@@ -17702,7 +17708,7 @@
         </p:spPr>
         <p:txBody>
           <a:bodyPr>
-            <a:normAutofit fontScale="90000"/>
+            <a:normAutofit/>
           </a:bodyPr>
           <a:lstStyle>
             <a:lvl1pPr defTabSz="403097">
@@ -17738,7 +17744,7 @@
           </a:ln>
           <a:extLst>
             <a:ext uri="{C572A759-6A51-4108-AA02-DFA0A04FC94B}">
-              <ma14:wrappingTextBoxFlag xmlns="" xmlns:ma14="http://schemas.microsoft.com/office/mac/drawingml/2011/main" val="1"/>
+              <ma14:wrappingTextBoxFlag xmlns:ma14="http://schemas.microsoft.com/office/mac/drawingml/2011/main" xmlns="" val="1"/>
             </a:ext>
           </a:extLst>
         </p:spPr>
@@ -17798,7 +17804,7 @@
           </a:ln>
           <a:extLst>
             <a:ext uri="{C572A759-6A51-4108-AA02-DFA0A04FC94B}">
-              <ma14:wrappingTextBoxFlag xmlns="" xmlns:ma14="http://schemas.microsoft.com/office/mac/drawingml/2011/main" val="1"/>
+              <ma14:wrappingTextBoxFlag xmlns:ma14="http://schemas.microsoft.com/office/mac/drawingml/2011/main" xmlns="" val="1"/>
             </a:ext>
           </a:extLst>
         </p:spPr>

</xml_diff>

<commit_message>
Revert "some small updates to Session09"
This reverts commit 1274948becb05457c869518622f60a064e2e194f.
</commit_message>
<xml_diff>
--- a/Session09/Session9_Slides.pptx
+++ b/Session09/Session9_Slides.pptx
@@ -10616,7 +10616,7 @@
           </a:ln>
           <a:extLst>
             <a:ext uri="{C572A759-6A51-4108-AA02-DFA0A04FC94B}">
-              <ma14:wrappingTextBoxFlag xmlns="" xmlns:ma14="http://schemas.microsoft.com/office/mac/drawingml/2011/main" val="1"/>
+              <ma14:wrappingTextBoxFlag xmlns:ma14="http://schemas.microsoft.com/office/mac/drawingml/2011/main" xmlns="" val="1"/>
             </a:ext>
           </a:extLst>
         </p:spPr>
@@ -10655,7 +10655,7 @@
           </a:ln>
           <a:extLst>
             <a:ext uri="{C572A759-6A51-4108-AA02-DFA0A04FC94B}">
-              <ma14:wrappingTextBoxFlag xmlns="" xmlns:ma14="http://schemas.microsoft.com/office/mac/drawingml/2011/main" val="1"/>
+              <ma14:wrappingTextBoxFlag xmlns:ma14="http://schemas.microsoft.com/office/mac/drawingml/2011/main" xmlns="" val="1"/>
             </a:ext>
           </a:extLst>
         </p:spPr>
@@ -11719,7 +11719,7 @@
           </a:ln>
           <a:extLst>
             <a:ext uri="{C572A759-6A51-4108-AA02-DFA0A04FC94B}">
-              <ma14:wrappingTextBoxFlag xmlns:ma14="http://schemas.microsoft.com/office/mac/drawingml/2011/main" xmlns="" val="1"/>
+              <ma14:wrappingTextBoxFlag xmlns="" xmlns:ma14="http://schemas.microsoft.com/office/mac/drawingml/2011/main" val="1"/>
             </a:ext>
           </a:extLst>
         </p:spPr>
@@ -11758,7 +11758,7 @@
           </a:ln>
           <a:extLst>
             <a:ext uri="{C572A759-6A51-4108-AA02-DFA0A04FC94B}">
-              <ma14:wrappingTextBoxFlag xmlns:ma14="http://schemas.microsoft.com/office/mac/drawingml/2011/main" xmlns="" val="1"/>
+              <ma14:wrappingTextBoxFlag xmlns="" xmlns:ma14="http://schemas.microsoft.com/office/mac/drawingml/2011/main" val="1"/>
             </a:ext>
           </a:extLst>
         </p:spPr>
@@ -12853,7 +12853,7 @@
           </a:ln>
           <a:extLst>
             <a:ext uri="{C572A759-6A51-4108-AA02-DFA0A04FC94B}">
-              <ma14:wrappingTextBoxFlag xmlns:ma14="http://schemas.microsoft.com/office/mac/drawingml/2011/main" xmlns="" val="1"/>
+              <ma14:wrappingTextBoxFlag xmlns="" xmlns:ma14="http://schemas.microsoft.com/office/mac/drawingml/2011/main" val="1"/>
             </a:ext>
           </a:extLst>
         </p:spPr>
@@ -12964,7 +12964,7 @@
           </a:ln>
           <a:extLst>
             <a:ext uri="{C572A759-6A51-4108-AA02-DFA0A04FC94B}">
-              <ma14:wrappingTextBoxFlag xmlns:ma14="http://schemas.microsoft.com/office/mac/drawingml/2011/main" xmlns="" val="1"/>
+              <ma14:wrappingTextBoxFlag xmlns="" xmlns:ma14="http://schemas.microsoft.com/office/mac/drawingml/2011/main" val="1"/>
             </a:ext>
           </a:extLst>
         </p:spPr>
@@ -13199,7 +13199,7 @@
           </a:ln>
           <a:extLst>
             <a:ext uri="{C572A759-6A51-4108-AA02-DFA0A04FC94B}">
-              <ma14:wrappingTextBoxFlag xmlns:ma14="http://schemas.microsoft.com/office/mac/drawingml/2011/main" xmlns="" val="1"/>
+              <ma14:wrappingTextBoxFlag xmlns="" xmlns:ma14="http://schemas.microsoft.com/office/mac/drawingml/2011/main" val="1"/>
             </a:ext>
           </a:extLst>
         </p:spPr>
@@ -13261,7 +13261,7 @@
           </a:ln>
           <a:extLst>
             <a:ext uri="{C572A759-6A51-4108-AA02-DFA0A04FC94B}">
-              <ma14:wrappingTextBoxFlag xmlns:ma14="http://schemas.microsoft.com/office/mac/drawingml/2011/main" xmlns="" val="1"/>
+              <ma14:wrappingTextBoxFlag xmlns="" xmlns:ma14="http://schemas.microsoft.com/office/mac/drawingml/2011/main" val="1"/>
             </a:ext>
           </a:extLst>
         </p:spPr>
@@ -13328,7 +13328,7 @@
           </a:ln>
           <a:extLst>
             <a:ext uri="{C572A759-6A51-4108-AA02-DFA0A04FC94B}">
-              <ma14:wrappingTextBoxFlag xmlns:ma14="http://schemas.microsoft.com/office/mac/drawingml/2011/main" xmlns="" val="1"/>
+              <ma14:wrappingTextBoxFlag xmlns="" xmlns:ma14="http://schemas.microsoft.com/office/mac/drawingml/2011/main" val="1"/>
             </a:ext>
           </a:extLst>
         </p:spPr>
@@ -13395,7 +13395,7 @@
           </a:ln>
           <a:extLst>
             <a:ext uri="{C572A759-6A51-4108-AA02-DFA0A04FC94B}">
-              <ma14:wrappingTextBoxFlag xmlns:ma14="http://schemas.microsoft.com/office/mac/drawingml/2011/main" xmlns="" val="1"/>
+              <ma14:wrappingTextBoxFlag xmlns="" xmlns:ma14="http://schemas.microsoft.com/office/mac/drawingml/2011/main" val="1"/>
             </a:ext>
           </a:extLst>
         </p:spPr>
@@ -13524,7 +13524,7 @@
           </a:ln>
           <a:extLst>
             <a:ext uri="{C572A759-6A51-4108-AA02-DFA0A04FC94B}">
-              <ma14:wrappingTextBoxFlag xmlns:ma14="http://schemas.microsoft.com/office/mac/drawingml/2011/main" xmlns="" val="1"/>
+              <ma14:wrappingTextBoxFlag xmlns="" xmlns:ma14="http://schemas.microsoft.com/office/mac/drawingml/2011/main" val="1"/>
             </a:ext>
           </a:extLst>
         </p:spPr>
@@ -14427,7 +14427,7 @@
         </p:spPr>
         <p:txBody>
           <a:bodyPr>
-            <a:normAutofit/>
+            <a:normAutofit fontScale="90000"/>
           </a:bodyPr>
           <a:lstStyle>
             <a:lvl1pPr defTabSz="403097">
@@ -15169,7 +15169,7 @@
 </file>
 
 <file path=ppt/slides/slide21.xml><?xml version="1.0" encoding="utf-8"?>
-<p:sld xmlns:a="http://schemas.openxmlformats.org/drawingml/2006/main" xmlns:r="http://schemas.openxmlformats.org/officeDocument/2006/relationships" xmlns:p="http://schemas.openxmlformats.org/presentationml/2006/main" show="0">
+<p:sld xmlns:a="http://schemas.openxmlformats.org/drawingml/2006/main" xmlns:r="http://schemas.openxmlformats.org/officeDocument/2006/relationships" xmlns:p="http://schemas.openxmlformats.org/presentationml/2006/main">
   <p:cSld>
     <p:spTree>
       <p:nvGrpSpPr>
@@ -15290,7 +15290,7 @@
 </file>
 
 <file path=ppt/slides/slide22.xml><?xml version="1.0" encoding="utf-8"?>
-<p:sld xmlns:a="http://schemas.openxmlformats.org/drawingml/2006/main" xmlns:r="http://schemas.openxmlformats.org/officeDocument/2006/relationships" xmlns:p="http://schemas.openxmlformats.org/presentationml/2006/main" show="0">
+<p:sld xmlns:a="http://schemas.openxmlformats.org/drawingml/2006/main" xmlns:r="http://schemas.openxmlformats.org/officeDocument/2006/relationships" xmlns:p="http://schemas.openxmlformats.org/presentationml/2006/main">
   <p:cSld>
     <p:spTree>
       <p:nvGrpSpPr>
@@ -15420,7 +15420,7 @@
 </file>
 
 <file path=ppt/slides/slide23.xml><?xml version="1.0" encoding="utf-8"?>
-<p:sld xmlns:a="http://schemas.openxmlformats.org/drawingml/2006/main" xmlns:r="http://schemas.openxmlformats.org/officeDocument/2006/relationships" xmlns:p="http://schemas.openxmlformats.org/presentationml/2006/main" show="0">
+<p:sld xmlns:a="http://schemas.openxmlformats.org/drawingml/2006/main" xmlns:r="http://schemas.openxmlformats.org/officeDocument/2006/relationships" xmlns:p="http://schemas.openxmlformats.org/presentationml/2006/main">
   <p:cSld>
     <p:spTree>
       <p:nvGrpSpPr>
@@ -15544,7 +15544,7 @@
           </a:ln>
           <a:extLst>
             <a:ext uri="{C572A759-6A51-4108-AA02-DFA0A04FC94B}">
-              <ma14:wrappingTextBoxFlag xmlns:ma14="http://schemas.microsoft.com/office/mac/drawingml/2011/main" xmlns="" val="1"/>
+              <ma14:wrappingTextBoxFlag xmlns="" xmlns:ma14="http://schemas.microsoft.com/office/mac/drawingml/2011/main" val="1"/>
             </a:ext>
           </a:extLst>
         </p:spPr>
@@ -15832,7 +15832,7 @@
           <a:p>
             <a:r>
               <a:rPr lang="en-US" dirty="0"/>
-              <a:t>Compares model’s error to deviations from the  average</a:t>
+              <a:t>Compares model’s error to error against average</a:t>
             </a:r>
           </a:p>
           <a:p>
@@ -15953,8 +15953,8 @@
           </a:p>
         </p:txBody>
       </p:sp>
-      <mc:AlternateContent xmlns:mc="http://schemas.openxmlformats.org/markup-compatibility/2006">
-        <mc:Choice xmlns:a14="http://schemas.microsoft.com/office/drawing/2010/main" Requires="a14">
+      <mc:AlternateContent xmlns:mc="http://schemas.openxmlformats.org/markup-compatibility/2006" xmlns:a14="http://schemas.microsoft.com/office/drawing/2010/main">
+        <mc:Choice Requires="a14">
           <p:sp>
             <p:nvSpPr>
               <p:cNvPr id="2" name="Text Placeholder 1">
@@ -15991,13 +15991,7 @@
                         <a:rPr lang="en-US" sz="3800" b="0" i="1" smtClean="0">
                           <a:latin typeface="Cambria Math" panose="02040503050406030204" pitchFamily="18" charset="0"/>
                         </a:rPr>
-                        <m:t>𝑆𝑆</m:t>
-                      </m:r>
-                      <m:r>
-                        <a:rPr lang="en-US" sz="3800" b="0" i="1" smtClean="0">
-                          <a:latin typeface="Cambria Math" panose="02040503050406030204" pitchFamily="18" charset="0"/>
-                        </a:rPr>
-                        <m:t>𝑇</m:t>
+                        <m:t>𝑆𝑆𝑇</m:t>
                       </m:r>
                       <m:r>
                         <a:rPr lang="en-US" sz="3800" b="0" i="1" smtClean="0">
@@ -16547,7 +16541,7 @@
             </p:txBody>
           </p:sp>
         </mc:Choice>
-        <mc:Fallback>
+        <mc:Fallback xmlns="">
           <p:sp>
             <p:nvSpPr>
               <p:cNvPr id="2" name="Text Placeholder 1">
@@ -16568,7 +16562,7 @@
               <a:blipFill>
                 <a:blip r:embed="rId2"/>
                 <a:stretch>
-                  <a:fillRect l="-1873" t="-28515" b="-3366"/>
+                  <a:fillRect/>
                 </a:stretch>
               </a:blipFill>
             </p:spPr>
@@ -16980,7 +16974,7 @@
         </p:spPr>
         <p:txBody>
           <a:bodyPr>
-            <a:normAutofit/>
+            <a:normAutofit fontScale="90000"/>
           </a:bodyPr>
           <a:lstStyle>
             <a:lvl1pPr defTabSz="403097">
@@ -17016,7 +17010,7 @@
           </a:ln>
           <a:extLst>
             <a:ext uri="{C572A759-6A51-4108-AA02-DFA0A04FC94B}">
-              <ma14:wrappingTextBoxFlag xmlns:ma14="http://schemas.microsoft.com/office/mac/drawingml/2011/main" xmlns="" val="1"/>
+              <ma14:wrappingTextBoxFlag xmlns="" xmlns:ma14="http://schemas.microsoft.com/office/mac/drawingml/2011/main" val="1"/>
             </a:ext>
           </a:extLst>
         </p:spPr>
@@ -17060,7 +17054,7 @@
           </a:ln>
           <a:extLst>
             <a:ext uri="{C572A759-6A51-4108-AA02-DFA0A04FC94B}">
-              <ma14:wrappingTextBoxFlag xmlns:ma14="http://schemas.microsoft.com/office/mac/drawingml/2011/main" xmlns="" val="1"/>
+              <ma14:wrappingTextBoxFlag xmlns="" xmlns:ma14="http://schemas.microsoft.com/office/mac/drawingml/2011/main" val="1"/>
             </a:ext>
           </a:extLst>
         </p:spPr>
@@ -17274,7 +17268,7 @@
           </a:ln>
           <a:extLst>
             <a:ext uri="{C572A759-6A51-4108-AA02-DFA0A04FC94B}">
-              <ma14:wrappingTextBoxFlag xmlns:ma14="http://schemas.microsoft.com/office/mac/drawingml/2011/main" xmlns="" val="1"/>
+              <ma14:wrappingTextBoxFlag xmlns="" xmlns:ma14="http://schemas.microsoft.com/office/mac/drawingml/2011/main" val="1"/>
             </a:ext>
           </a:extLst>
         </p:spPr>
@@ -17392,7 +17386,7 @@
           </a:ln>
           <a:extLst>
             <a:ext uri="{C572A759-6A51-4108-AA02-DFA0A04FC94B}">
-              <ma14:wrappingTextBoxFlag xmlns:ma14="http://schemas.microsoft.com/office/mac/drawingml/2011/main" xmlns="" val="1"/>
+              <ma14:wrappingTextBoxFlag xmlns="" xmlns:ma14="http://schemas.microsoft.com/office/mac/drawingml/2011/main" val="1"/>
             </a:ext>
           </a:extLst>
         </p:spPr>
@@ -17489,7 +17483,7 @@
         </p:spPr>
         <p:txBody>
           <a:bodyPr>
-            <a:normAutofit/>
+            <a:normAutofit fontScale="90000"/>
           </a:bodyPr>
           <a:lstStyle>
             <a:lvl1pPr defTabSz="455675">
@@ -17550,7 +17544,7 @@
         </p:spPr>
         <p:txBody>
           <a:bodyPr>
-            <a:normAutofit/>
+            <a:normAutofit fontScale="90000"/>
           </a:bodyPr>
           <a:lstStyle>
             <a:lvl1pPr defTabSz="403097">
@@ -17586,7 +17580,7 @@
           </a:ln>
           <a:extLst>
             <a:ext uri="{C572A759-6A51-4108-AA02-DFA0A04FC94B}">
-              <ma14:wrappingTextBoxFlag xmlns:ma14="http://schemas.microsoft.com/office/mac/drawingml/2011/main" xmlns="" val="1"/>
+              <ma14:wrappingTextBoxFlag xmlns="" xmlns:ma14="http://schemas.microsoft.com/office/mac/drawingml/2011/main" val="1"/>
             </a:ext>
           </a:extLst>
         </p:spPr>
@@ -17708,7 +17702,7 @@
         </p:spPr>
         <p:txBody>
           <a:bodyPr>
-            <a:normAutofit/>
+            <a:normAutofit fontScale="90000"/>
           </a:bodyPr>
           <a:lstStyle>
             <a:lvl1pPr defTabSz="403097">
@@ -17744,7 +17738,7 @@
           </a:ln>
           <a:extLst>
             <a:ext uri="{C572A759-6A51-4108-AA02-DFA0A04FC94B}">
-              <ma14:wrappingTextBoxFlag xmlns:ma14="http://schemas.microsoft.com/office/mac/drawingml/2011/main" xmlns="" val="1"/>
+              <ma14:wrappingTextBoxFlag xmlns="" xmlns:ma14="http://schemas.microsoft.com/office/mac/drawingml/2011/main" val="1"/>
             </a:ext>
           </a:extLst>
         </p:spPr>
@@ -17804,7 +17798,7 @@
           </a:ln>
           <a:extLst>
             <a:ext uri="{C572A759-6A51-4108-AA02-DFA0A04FC94B}">
-              <ma14:wrappingTextBoxFlag xmlns:ma14="http://schemas.microsoft.com/office/mac/drawingml/2011/main" xmlns="" val="1"/>
+              <ma14:wrappingTextBoxFlag xmlns="" xmlns:ma14="http://schemas.microsoft.com/office/mac/drawingml/2011/main" val="1"/>
             </a:ext>
           </a:extLst>
         </p:spPr>

</xml_diff>

<commit_message>
Revert "Revert "some small updates to Session09""
This reverts commit 70f99593b7af9369820e0e35bb3c68cf699f7e3a.
</commit_message>
<xml_diff>
--- a/Session09/Session9_Slides.pptx
+++ b/Session09/Session9_Slides.pptx
@@ -10616,7 +10616,7 @@
           </a:ln>
           <a:extLst>
             <a:ext uri="{C572A759-6A51-4108-AA02-DFA0A04FC94B}">
-              <ma14:wrappingTextBoxFlag xmlns:ma14="http://schemas.microsoft.com/office/mac/drawingml/2011/main" xmlns="" val="1"/>
+              <ma14:wrappingTextBoxFlag xmlns="" xmlns:ma14="http://schemas.microsoft.com/office/mac/drawingml/2011/main" val="1"/>
             </a:ext>
           </a:extLst>
         </p:spPr>
@@ -10655,7 +10655,7 @@
           </a:ln>
           <a:extLst>
             <a:ext uri="{C572A759-6A51-4108-AA02-DFA0A04FC94B}">
-              <ma14:wrappingTextBoxFlag xmlns:ma14="http://schemas.microsoft.com/office/mac/drawingml/2011/main" xmlns="" val="1"/>
+              <ma14:wrappingTextBoxFlag xmlns="" xmlns:ma14="http://schemas.microsoft.com/office/mac/drawingml/2011/main" val="1"/>
             </a:ext>
           </a:extLst>
         </p:spPr>
@@ -11719,7 +11719,7 @@
           </a:ln>
           <a:extLst>
             <a:ext uri="{C572A759-6A51-4108-AA02-DFA0A04FC94B}">
-              <ma14:wrappingTextBoxFlag xmlns="" xmlns:ma14="http://schemas.microsoft.com/office/mac/drawingml/2011/main" val="1"/>
+              <ma14:wrappingTextBoxFlag xmlns:ma14="http://schemas.microsoft.com/office/mac/drawingml/2011/main" xmlns="" val="1"/>
             </a:ext>
           </a:extLst>
         </p:spPr>
@@ -11758,7 +11758,7 @@
           </a:ln>
           <a:extLst>
             <a:ext uri="{C572A759-6A51-4108-AA02-DFA0A04FC94B}">
-              <ma14:wrappingTextBoxFlag xmlns="" xmlns:ma14="http://schemas.microsoft.com/office/mac/drawingml/2011/main" val="1"/>
+              <ma14:wrappingTextBoxFlag xmlns:ma14="http://schemas.microsoft.com/office/mac/drawingml/2011/main" xmlns="" val="1"/>
             </a:ext>
           </a:extLst>
         </p:spPr>
@@ -12853,7 +12853,7 @@
           </a:ln>
           <a:extLst>
             <a:ext uri="{C572A759-6A51-4108-AA02-DFA0A04FC94B}">
-              <ma14:wrappingTextBoxFlag xmlns="" xmlns:ma14="http://schemas.microsoft.com/office/mac/drawingml/2011/main" val="1"/>
+              <ma14:wrappingTextBoxFlag xmlns:ma14="http://schemas.microsoft.com/office/mac/drawingml/2011/main" xmlns="" val="1"/>
             </a:ext>
           </a:extLst>
         </p:spPr>
@@ -12964,7 +12964,7 @@
           </a:ln>
           <a:extLst>
             <a:ext uri="{C572A759-6A51-4108-AA02-DFA0A04FC94B}">
-              <ma14:wrappingTextBoxFlag xmlns="" xmlns:ma14="http://schemas.microsoft.com/office/mac/drawingml/2011/main" val="1"/>
+              <ma14:wrappingTextBoxFlag xmlns:ma14="http://schemas.microsoft.com/office/mac/drawingml/2011/main" xmlns="" val="1"/>
             </a:ext>
           </a:extLst>
         </p:spPr>
@@ -13199,7 +13199,7 @@
           </a:ln>
           <a:extLst>
             <a:ext uri="{C572A759-6A51-4108-AA02-DFA0A04FC94B}">
-              <ma14:wrappingTextBoxFlag xmlns="" xmlns:ma14="http://schemas.microsoft.com/office/mac/drawingml/2011/main" val="1"/>
+              <ma14:wrappingTextBoxFlag xmlns:ma14="http://schemas.microsoft.com/office/mac/drawingml/2011/main" xmlns="" val="1"/>
             </a:ext>
           </a:extLst>
         </p:spPr>
@@ -13261,7 +13261,7 @@
           </a:ln>
           <a:extLst>
             <a:ext uri="{C572A759-6A51-4108-AA02-DFA0A04FC94B}">
-              <ma14:wrappingTextBoxFlag xmlns="" xmlns:ma14="http://schemas.microsoft.com/office/mac/drawingml/2011/main" val="1"/>
+              <ma14:wrappingTextBoxFlag xmlns:ma14="http://schemas.microsoft.com/office/mac/drawingml/2011/main" xmlns="" val="1"/>
             </a:ext>
           </a:extLst>
         </p:spPr>
@@ -13328,7 +13328,7 @@
           </a:ln>
           <a:extLst>
             <a:ext uri="{C572A759-6A51-4108-AA02-DFA0A04FC94B}">
-              <ma14:wrappingTextBoxFlag xmlns="" xmlns:ma14="http://schemas.microsoft.com/office/mac/drawingml/2011/main" val="1"/>
+              <ma14:wrappingTextBoxFlag xmlns:ma14="http://schemas.microsoft.com/office/mac/drawingml/2011/main" xmlns="" val="1"/>
             </a:ext>
           </a:extLst>
         </p:spPr>
@@ -13395,7 +13395,7 @@
           </a:ln>
           <a:extLst>
             <a:ext uri="{C572A759-6A51-4108-AA02-DFA0A04FC94B}">
-              <ma14:wrappingTextBoxFlag xmlns="" xmlns:ma14="http://schemas.microsoft.com/office/mac/drawingml/2011/main" val="1"/>
+              <ma14:wrappingTextBoxFlag xmlns:ma14="http://schemas.microsoft.com/office/mac/drawingml/2011/main" xmlns="" val="1"/>
             </a:ext>
           </a:extLst>
         </p:spPr>
@@ -13524,7 +13524,7 @@
           </a:ln>
           <a:extLst>
             <a:ext uri="{C572A759-6A51-4108-AA02-DFA0A04FC94B}">
-              <ma14:wrappingTextBoxFlag xmlns="" xmlns:ma14="http://schemas.microsoft.com/office/mac/drawingml/2011/main" val="1"/>
+              <ma14:wrappingTextBoxFlag xmlns:ma14="http://schemas.microsoft.com/office/mac/drawingml/2011/main" xmlns="" val="1"/>
             </a:ext>
           </a:extLst>
         </p:spPr>
@@ -14427,7 +14427,7 @@
         </p:spPr>
         <p:txBody>
           <a:bodyPr>
-            <a:normAutofit fontScale="90000"/>
+            <a:normAutofit/>
           </a:bodyPr>
           <a:lstStyle>
             <a:lvl1pPr defTabSz="403097">
@@ -15169,7 +15169,7 @@
 </file>
 
 <file path=ppt/slides/slide21.xml><?xml version="1.0" encoding="utf-8"?>
-<p:sld xmlns:a="http://schemas.openxmlformats.org/drawingml/2006/main" xmlns:r="http://schemas.openxmlformats.org/officeDocument/2006/relationships" xmlns:p="http://schemas.openxmlformats.org/presentationml/2006/main">
+<p:sld xmlns:a="http://schemas.openxmlformats.org/drawingml/2006/main" xmlns:r="http://schemas.openxmlformats.org/officeDocument/2006/relationships" xmlns:p="http://schemas.openxmlformats.org/presentationml/2006/main" show="0">
   <p:cSld>
     <p:spTree>
       <p:nvGrpSpPr>
@@ -15290,7 +15290,7 @@
 </file>
 
 <file path=ppt/slides/slide22.xml><?xml version="1.0" encoding="utf-8"?>
-<p:sld xmlns:a="http://schemas.openxmlformats.org/drawingml/2006/main" xmlns:r="http://schemas.openxmlformats.org/officeDocument/2006/relationships" xmlns:p="http://schemas.openxmlformats.org/presentationml/2006/main">
+<p:sld xmlns:a="http://schemas.openxmlformats.org/drawingml/2006/main" xmlns:r="http://schemas.openxmlformats.org/officeDocument/2006/relationships" xmlns:p="http://schemas.openxmlformats.org/presentationml/2006/main" show="0">
   <p:cSld>
     <p:spTree>
       <p:nvGrpSpPr>
@@ -15420,7 +15420,7 @@
 </file>
 
 <file path=ppt/slides/slide23.xml><?xml version="1.0" encoding="utf-8"?>
-<p:sld xmlns:a="http://schemas.openxmlformats.org/drawingml/2006/main" xmlns:r="http://schemas.openxmlformats.org/officeDocument/2006/relationships" xmlns:p="http://schemas.openxmlformats.org/presentationml/2006/main">
+<p:sld xmlns:a="http://schemas.openxmlformats.org/drawingml/2006/main" xmlns:r="http://schemas.openxmlformats.org/officeDocument/2006/relationships" xmlns:p="http://schemas.openxmlformats.org/presentationml/2006/main" show="0">
   <p:cSld>
     <p:spTree>
       <p:nvGrpSpPr>
@@ -15544,7 +15544,7 @@
           </a:ln>
           <a:extLst>
             <a:ext uri="{C572A759-6A51-4108-AA02-DFA0A04FC94B}">
-              <ma14:wrappingTextBoxFlag xmlns="" xmlns:ma14="http://schemas.microsoft.com/office/mac/drawingml/2011/main" val="1"/>
+              <ma14:wrappingTextBoxFlag xmlns:ma14="http://schemas.microsoft.com/office/mac/drawingml/2011/main" xmlns="" val="1"/>
             </a:ext>
           </a:extLst>
         </p:spPr>
@@ -15832,7 +15832,7 @@
           <a:p>
             <a:r>
               <a:rPr lang="en-US" dirty="0"/>
-              <a:t>Compares model’s error to error against average</a:t>
+              <a:t>Compares model’s error to deviations from the  average</a:t>
             </a:r>
           </a:p>
           <a:p>
@@ -15953,8 +15953,8 @@
           </a:p>
         </p:txBody>
       </p:sp>
-      <mc:AlternateContent xmlns:mc="http://schemas.openxmlformats.org/markup-compatibility/2006" xmlns:a14="http://schemas.microsoft.com/office/drawing/2010/main">
-        <mc:Choice Requires="a14">
+      <mc:AlternateContent xmlns:mc="http://schemas.openxmlformats.org/markup-compatibility/2006">
+        <mc:Choice xmlns:a14="http://schemas.microsoft.com/office/drawing/2010/main" Requires="a14">
           <p:sp>
             <p:nvSpPr>
               <p:cNvPr id="2" name="Text Placeholder 1">
@@ -15991,7 +15991,13 @@
                         <a:rPr lang="en-US" sz="3800" b="0" i="1" smtClean="0">
                           <a:latin typeface="Cambria Math" panose="02040503050406030204" pitchFamily="18" charset="0"/>
                         </a:rPr>
-                        <m:t>𝑆𝑆𝑇</m:t>
+                        <m:t>𝑆𝑆</m:t>
+                      </m:r>
+                      <m:r>
+                        <a:rPr lang="en-US" sz="3800" b="0" i="1" smtClean="0">
+                          <a:latin typeface="Cambria Math" panose="02040503050406030204" pitchFamily="18" charset="0"/>
+                        </a:rPr>
+                        <m:t>𝑇</m:t>
                       </m:r>
                       <m:r>
                         <a:rPr lang="en-US" sz="3800" b="0" i="1" smtClean="0">
@@ -16541,7 +16547,7 @@
             </p:txBody>
           </p:sp>
         </mc:Choice>
-        <mc:Fallback xmlns="">
+        <mc:Fallback>
           <p:sp>
             <p:nvSpPr>
               <p:cNvPr id="2" name="Text Placeholder 1">
@@ -16562,7 +16568,7 @@
               <a:blipFill>
                 <a:blip r:embed="rId2"/>
                 <a:stretch>
-                  <a:fillRect/>
+                  <a:fillRect l="-1873" t="-28515" b="-3366"/>
                 </a:stretch>
               </a:blipFill>
             </p:spPr>
@@ -16974,7 +16980,7 @@
         </p:spPr>
         <p:txBody>
           <a:bodyPr>
-            <a:normAutofit fontScale="90000"/>
+            <a:normAutofit/>
           </a:bodyPr>
           <a:lstStyle>
             <a:lvl1pPr defTabSz="403097">
@@ -17010,7 +17016,7 @@
           </a:ln>
           <a:extLst>
             <a:ext uri="{C572A759-6A51-4108-AA02-DFA0A04FC94B}">
-              <ma14:wrappingTextBoxFlag xmlns="" xmlns:ma14="http://schemas.microsoft.com/office/mac/drawingml/2011/main" val="1"/>
+              <ma14:wrappingTextBoxFlag xmlns:ma14="http://schemas.microsoft.com/office/mac/drawingml/2011/main" xmlns="" val="1"/>
             </a:ext>
           </a:extLst>
         </p:spPr>
@@ -17054,7 +17060,7 @@
           </a:ln>
           <a:extLst>
             <a:ext uri="{C572A759-6A51-4108-AA02-DFA0A04FC94B}">
-              <ma14:wrappingTextBoxFlag xmlns="" xmlns:ma14="http://schemas.microsoft.com/office/mac/drawingml/2011/main" val="1"/>
+              <ma14:wrappingTextBoxFlag xmlns:ma14="http://schemas.microsoft.com/office/mac/drawingml/2011/main" xmlns="" val="1"/>
             </a:ext>
           </a:extLst>
         </p:spPr>
@@ -17268,7 +17274,7 @@
           </a:ln>
           <a:extLst>
             <a:ext uri="{C572A759-6A51-4108-AA02-DFA0A04FC94B}">
-              <ma14:wrappingTextBoxFlag xmlns="" xmlns:ma14="http://schemas.microsoft.com/office/mac/drawingml/2011/main" val="1"/>
+              <ma14:wrappingTextBoxFlag xmlns:ma14="http://schemas.microsoft.com/office/mac/drawingml/2011/main" xmlns="" val="1"/>
             </a:ext>
           </a:extLst>
         </p:spPr>
@@ -17386,7 +17392,7 @@
           </a:ln>
           <a:extLst>
             <a:ext uri="{C572A759-6A51-4108-AA02-DFA0A04FC94B}">
-              <ma14:wrappingTextBoxFlag xmlns="" xmlns:ma14="http://schemas.microsoft.com/office/mac/drawingml/2011/main" val="1"/>
+              <ma14:wrappingTextBoxFlag xmlns:ma14="http://schemas.microsoft.com/office/mac/drawingml/2011/main" xmlns="" val="1"/>
             </a:ext>
           </a:extLst>
         </p:spPr>
@@ -17483,7 +17489,7 @@
         </p:spPr>
         <p:txBody>
           <a:bodyPr>
-            <a:normAutofit fontScale="90000"/>
+            <a:normAutofit/>
           </a:bodyPr>
           <a:lstStyle>
             <a:lvl1pPr defTabSz="455675">
@@ -17544,7 +17550,7 @@
         </p:spPr>
         <p:txBody>
           <a:bodyPr>
-            <a:normAutofit fontScale="90000"/>
+            <a:normAutofit/>
           </a:bodyPr>
           <a:lstStyle>
             <a:lvl1pPr defTabSz="403097">
@@ -17580,7 +17586,7 @@
           </a:ln>
           <a:extLst>
             <a:ext uri="{C572A759-6A51-4108-AA02-DFA0A04FC94B}">
-              <ma14:wrappingTextBoxFlag xmlns="" xmlns:ma14="http://schemas.microsoft.com/office/mac/drawingml/2011/main" val="1"/>
+              <ma14:wrappingTextBoxFlag xmlns:ma14="http://schemas.microsoft.com/office/mac/drawingml/2011/main" xmlns="" val="1"/>
             </a:ext>
           </a:extLst>
         </p:spPr>
@@ -17702,7 +17708,7 @@
         </p:spPr>
         <p:txBody>
           <a:bodyPr>
-            <a:normAutofit fontScale="90000"/>
+            <a:normAutofit/>
           </a:bodyPr>
           <a:lstStyle>
             <a:lvl1pPr defTabSz="403097">
@@ -17738,7 +17744,7 @@
           </a:ln>
           <a:extLst>
             <a:ext uri="{C572A759-6A51-4108-AA02-DFA0A04FC94B}">
-              <ma14:wrappingTextBoxFlag xmlns="" xmlns:ma14="http://schemas.microsoft.com/office/mac/drawingml/2011/main" val="1"/>
+              <ma14:wrappingTextBoxFlag xmlns:ma14="http://schemas.microsoft.com/office/mac/drawingml/2011/main" xmlns="" val="1"/>
             </a:ext>
           </a:extLst>
         </p:spPr>
@@ -17798,7 +17804,7 @@
           </a:ln>
           <a:extLst>
             <a:ext uri="{C572A759-6A51-4108-AA02-DFA0A04FC94B}">
-              <ma14:wrappingTextBoxFlag xmlns="" xmlns:ma14="http://schemas.microsoft.com/office/mac/drawingml/2011/main" val="1"/>
+              <ma14:wrappingTextBoxFlag xmlns:ma14="http://schemas.microsoft.com/office/mac/drawingml/2011/main" xmlns="" val="1"/>
             </a:ext>
           </a:extLst>
         </p:spPr>

</xml_diff>

<commit_message>
Trying to go back to the state of 1274948b
This reverts commit 46d6f7f25afb5f35ebc46223ea9f8d546f78e556.
</commit_message>
<xml_diff>
--- a/Session09/Session9_Slides.pptx
+++ b/Session09/Session9_Slides.pptx
@@ -10616,7 +10616,7 @@
           </a:ln>
           <a:extLst>
             <a:ext uri="{C572A759-6A51-4108-AA02-DFA0A04FC94B}">
-              <ma14:wrappingTextBoxFlag xmlns="" xmlns:ma14="http://schemas.microsoft.com/office/mac/drawingml/2011/main" val="1"/>
+              <ma14:wrappingTextBoxFlag xmlns:ma14="http://schemas.microsoft.com/office/mac/drawingml/2011/main" xmlns="" val="1"/>
             </a:ext>
           </a:extLst>
         </p:spPr>
@@ -10655,7 +10655,7 @@
           </a:ln>
           <a:extLst>
             <a:ext uri="{C572A759-6A51-4108-AA02-DFA0A04FC94B}">
-              <ma14:wrappingTextBoxFlag xmlns="" xmlns:ma14="http://schemas.microsoft.com/office/mac/drawingml/2011/main" val="1"/>
+              <ma14:wrappingTextBoxFlag xmlns:ma14="http://schemas.microsoft.com/office/mac/drawingml/2011/main" xmlns="" val="1"/>
             </a:ext>
           </a:extLst>
         </p:spPr>
@@ -11719,7 +11719,7 @@
           </a:ln>
           <a:extLst>
             <a:ext uri="{C572A759-6A51-4108-AA02-DFA0A04FC94B}">
-              <ma14:wrappingTextBoxFlag xmlns:ma14="http://schemas.microsoft.com/office/mac/drawingml/2011/main" xmlns="" val="1"/>
+              <ma14:wrappingTextBoxFlag xmlns="" xmlns:ma14="http://schemas.microsoft.com/office/mac/drawingml/2011/main" val="1"/>
             </a:ext>
           </a:extLst>
         </p:spPr>
@@ -11758,7 +11758,7 @@
           </a:ln>
           <a:extLst>
             <a:ext uri="{C572A759-6A51-4108-AA02-DFA0A04FC94B}">
-              <ma14:wrappingTextBoxFlag xmlns:ma14="http://schemas.microsoft.com/office/mac/drawingml/2011/main" xmlns="" val="1"/>
+              <ma14:wrappingTextBoxFlag xmlns="" xmlns:ma14="http://schemas.microsoft.com/office/mac/drawingml/2011/main" val="1"/>
             </a:ext>
           </a:extLst>
         </p:spPr>
@@ -12853,7 +12853,7 @@
           </a:ln>
           <a:extLst>
             <a:ext uri="{C572A759-6A51-4108-AA02-DFA0A04FC94B}">
-              <ma14:wrappingTextBoxFlag xmlns:ma14="http://schemas.microsoft.com/office/mac/drawingml/2011/main" xmlns="" val="1"/>
+              <ma14:wrappingTextBoxFlag xmlns="" xmlns:ma14="http://schemas.microsoft.com/office/mac/drawingml/2011/main" val="1"/>
             </a:ext>
           </a:extLst>
         </p:spPr>
@@ -12964,7 +12964,7 @@
           </a:ln>
           <a:extLst>
             <a:ext uri="{C572A759-6A51-4108-AA02-DFA0A04FC94B}">
-              <ma14:wrappingTextBoxFlag xmlns:ma14="http://schemas.microsoft.com/office/mac/drawingml/2011/main" xmlns="" val="1"/>
+              <ma14:wrappingTextBoxFlag xmlns="" xmlns:ma14="http://schemas.microsoft.com/office/mac/drawingml/2011/main" val="1"/>
             </a:ext>
           </a:extLst>
         </p:spPr>
@@ -13199,7 +13199,7 @@
           </a:ln>
           <a:extLst>
             <a:ext uri="{C572A759-6A51-4108-AA02-DFA0A04FC94B}">
-              <ma14:wrappingTextBoxFlag xmlns:ma14="http://schemas.microsoft.com/office/mac/drawingml/2011/main" xmlns="" val="1"/>
+              <ma14:wrappingTextBoxFlag xmlns="" xmlns:ma14="http://schemas.microsoft.com/office/mac/drawingml/2011/main" val="1"/>
             </a:ext>
           </a:extLst>
         </p:spPr>
@@ -13261,7 +13261,7 @@
           </a:ln>
           <a:extLst>
             <a:ext uri="{C572A759-6A51-4108-AA02-DFA0A04FC94B}">
-              <ma14:wrappingTextBoxFlag xmlns:ma14="http://schemas.microsoft.com/office/mac/drawingml/2011/main" xmlns="" val="1"/>
+              <ma14:wrappingTextBoxFlag xmlns="" xmlns:ma14="http://schemas.microsoft.com/office/mac/drawingml/2011/main" val="1"/>
             </a:ext>
           </a:extLst>
         </p:spPr>
@@ -13328,7 +13328,7 @@
           </a:ln>
           <a:extLst>
             <a:ext uri="{C572A759-6A51-4108-AA02-DFA0A04FC94B}">
-              <ma14:wrappingTextBoxFlag xmlns:ma14="http://schemas.microsoft.com/office/mac/drawingml/2011/main" xmlns="" val="1"/>
+              <ma14:wrappingTextBoxFlag xmlns="" xmlns:ma14="http://schemas.microsoft.com/office/mac/drawingml/2011/main" val="1"/>
             </a:ext>
           </a:extLst>
         </p:spPr>
@@ -13395,7 +13395,7 @@
           </a:ln>
           <a:extLst>
             <a:ext uri="{C572A759-6A51-4108-AA02-DFA0A04FC94B}">
-              <ma14:wrappingTextBoxFlag xmlns:ma14="http://schemas.microsoft.com/office/mac/drawingml/2011/main" xmlns="" val="1"/>
+              <ma14:wrappingTextBoxFlag xmlns="" xmlns:ma14="http://schemas.microsoft.com/office/mac/drawingml/2011/main" val="1"/>
             </a:ext>
           </a:extLst>
         </p:spPr>
@@ -13524,7 +13524,7 @@
           </a:ln>
           <a:extLst>
             <a:ext uri="{C572A759-6A51-4108-AA02-DFA0A04FC94B}">
-              <ma14:wrappingTextBoxFlag xmlns:ma14="http://schemas.microsoft.com/office/mac/drawingml/2011/main" xmlns="" val="1"/>
+              <ma14:wrappingTextBoxFlag xmlns="" xmlns:ma14="http://schemas.microsoft.com/office/mac/drawingml/2011/main" val="1"/>
             </a:ext>
           </a:extLst>
         </p:spPr>
@@ -14427,7 +14427,7 @@
         </p:spPr>
         <p:txBody>
           <a:bodyPr>
-            <a:normAutofit/>
+            <a:normAutofit fontScale="90000"/>
           </a:bodyPr>
           <a:lstStyle>
             <a:lvl1pPr defTabSz="403097">
@@ -15169,7 +15169,7 @@
 </file>
 
 <file path=ppt/slides/slide21.xml><?xml version="1.0" encoding="utf-8"?>
-<p:sld xmlns:a="http://schemas.openxmlformats.org/drawingml/2006/main" xmlns:r="http://schemas.openxmlformats.org/officeDocument/2006/relationships" xmlns:p="http://schemas.openxmlformats.org/presentationml/2006/main" show="0">
+<p:sld xmlns:a="http://schemas.openxmlformats.org/drawingml/2006/main" xmlns:r="http://schemas.openxmlformats.org/officeDocument/2006/relationships" xmlns:p="http://schemas.openxmlformats.org/presentationml/2006/main">
   <p:cSld>
     <p:spTree>
       <p:nvGrpSpPr>
@@ -15290,7 +15290,7 @@
 </file>
 
 <file path=ppt/slides/slide22.xml><?xml version="1.0" encoding="utf-8"?>
-<p:sld xmlns:a="http://schemas.openxmlformats.org/drawingml/2006/main" xmlns:r="http://schemas.openxmlformats.org/officeDocument/2006/relationships" xmlns:p="http://schemas.openxmlformats.org/presentationml/2006/main" show="0">
+<p:sld xmlns:a="http://schemas.openxmlformats.org/drawingml/2006/main" xmlns:r="http://schemas.openxmlformats.org/officeDocument/2006/relationships" xmlns:p="http://schemas.openxmlformats.org/presentationml/2006/main">
   <p:cSld>
     <p:spTree>
       <p:nvGrpSpPr>
@@ -15420,7 +15420,7 @@
 </file>
 
 <file path=ppt/slides/slide23.xml><?xml version="1.0" encoding="utf-8"?>
-<p:sld xmlns:a="http://schemas.openxmlformats.org/drawingml/2006/main" xmlns:r="http://schemas.openxmlformats.org/officeDocument/2006/relationships" xmlns:p="http://schemas.openxmlformats.org/presentationml/2006/main" show="0">
+<p:sld xmlns:a="http://schemas.openxmlformats.org/drawingml/2006/main" xmlns:r="http://schemas.openxmlformats.org/officeDocument/2006/relationships" xmlns:p="http://schemas.openxmlformats.org/presentationml/2006/main">
   <p:cSld>
     <p:spTree>
       <p:nvGrpSpPr>
@@ -15544,7 +15544,7 @@
           </a:ln>
           <a:extLst>
             <a:ext uri="{C572A759-6A51-4108-AA02-DFA0A04FC94B}">
-              <ma14:wrappingTextBoxFlag xmlns:ma14="http://schemas.microsoft.com/office/mac/drawingml/2011/main" xmlns="" val="1"/>
+              <ma14:wrappingTextBoxFlag xmlns="" xmlns:ma14="http://schemas.microsoft.com/office/mac/drawingml/2011/main" val="1"/>
             </a:ext>
           </a:extLst>
         </p:spPr>
@@ -15832,7 +15832,7 @@
           <a:p>
             <a:r>
               <a:rPr lang="en-US" dirty="0"/>
-              <a:t>Compares model’s error to deviations from the  average</a:t>
+              <a:t>Compares model’s error to error against average</a:t>
             </a:r>
           </a:p>
           <a:p>
@@ -15953,8 +15953,8 @@
           </a:p>
         </p:txBody>
       </p:sp>
-      <mc:AlternateContent xmlns:mc="http://schemas.openxmlformats.org/markup-compatibility/2006">
-        <mc:Choice xmlns:a14="http://schemas.microsoft.com/office/drawing/2010/main" Requires="a14">
+      <mc:AlternateContent xmlns:mc="http://schemas.openxmlformats.org/markup-compatibility/2006" xmlns:a14="http://schemas.microsoft.com/office/drawing/2010/main">
+        <mc:Choice Requires="a14">
           <p:sp>
             <p:nvSpPr>
               <p:cNvPr id="2" name="Text Placeholder 1">
@@ -15991,13 +15991,7 @@
                         <a:rPr lang="en-US" sz="3800" b="0" i="1" smtClean="0">
                           <a:latin typeface="Cambria Math" panose="02040503050406030204" pitchFamily="18" charset="0"/>
                         </a:rPr>
-                        <m:t>𝑆𝑆</m:t>
-                      </m:r>
-                      <m:r>
-                        <a:rPr lang="en-US" sz="3800" b="0" i="1" smtClean="0">
-                          <a:latin typeface="Cambria Math" panose="02040503050406030204" pitchFamily="18" charset="0"/>
-                        </a:rPr>
-                        <m:t>𝑇</m:t>
+                        <m:t>𝑆𝑆𝑇</m:t>
                       </m:r>
                       <m:r>
                         <a:rPr lang="en-US" sz="3800" b="0" i="1" smtClean="0">
@@ -16547,7 +16541,7 @@
             </p:txBody>
           </p:sp>
         </mc:Choice>
-        <mc:Fallback>
+        <mc:Fallback xmlns="">
           <p:sp>
             <p:nvSpPr>
               <p:cNvPr id="2" name="Text Placeholder 1">
@@ -16568,7 +16562,7 @@
               <a:blipFill>
                 <a:blip r:embed="rId2"/>
                 <a:stretch>
-                  <a:fillRect l="-1873" t="-28515" b="-3366"/>
+                  <a:fillRect/>
                 </a:stretch>
               </a:blipFill>
             </p:spPr>
@@ -16980,7 +16974,7 @@
         </p:spPr>
         <p:txBody>
           <a:bodyPr>
-            <a:normAutofit/>
+            <a:normAutofit fontScale="90000"/>
           </a:bodyPr>
           <a:lstStyle>
             <a:lvl1pPr defTabSz="403097">
@@ -17016,7 +17010,7 @@
           </a:ln>
           <a:extLst>
             <a:ext uri="{C572A759-6A51-4108-AA02-DFA0A04FC94B}">
-              <ma14:wrappingTextBoxFlag xmlns:ma14="http://schemas.microsoft.com/office/mac/drawingml/2011/main" xmlns="" val="1"/>
+              <ma14:wrappingTextBoxFlag xmlns="" xmlns:ma14="http://schemas.microsoft.com/office/mac/drawingml/2011/main" val="1"/>
             </a:ext>
           </a:extLst>
         </p:spPr>
@@ -17060,7 +17054,7 @@
           </a:ln>
           <a:extLst>
             <a:ext uri="{C572A759-6A51-4108-AA02-DFA0A04FC94B}">
-              <ma14:wrappingTextBoxFlag xmlns:ma14="http://schemas.microsoft.com/office/mac/drawingml/2011/main" xmlns="" val="1"/>
+              <ma14:wrappingTextBoxFlag xmlns="" xmlns:ma14="http://schemas.microsoft.com/office/mac/drawingml/2011/main" val="1"/>
             </a:ext>
           </a:extLst>
         </p:spPr>
@@ -17274,7 +17268,7 @@
           </a:ln>
           <a:extLst>
             <a:ext uri="{C572A759-6A51-4108-AA02-DFA0A04FC94B}">
-              <ma14:wrappingTextBoxFlag xmlns:ma14="http://schemas.microsoft.com/office/mac/drawingml/2011/main" xmlns="" val="1"/>
+              <ma14:wrappingTextBoxFlag xmlns="" xmlns:ma14="http://schemas.microsoft.com/office/mac/drawingml/2011/main" val="1"/>
             </a:ext>
           </a:extLst>
         </p:spPr>
@@ -17392,7 +17386,7 @@
           </a:ln>
           <a:extLst>
             <a:ext uri="{C572A759-6A51-4108-AA02-DFA0A04FC94B}">
-              <ma14:wrappingTextBoxFlag xmlns:ma14="http://schemas.microsoft.com/office/mac/drawingml/2011/main" xmlns="" val="1"/>
+              <ma14:wrappingTextBoxFlag xmlns="" xmlns:ma14="http://schemas.microsoft.com/office/mac/drawingml/2011/main" val="1"/>
             </a:ext>
           </a:extLst>
         </p:spPr>
@@ -17489,7 +17483,7 @@
         </p:spPr>
         <p:txBody>
           <a:bodyPr>
-            <a:normAutofit/>
+            <a:normAutofit fontScale="90000"/>
           </a:bodyPr>
           <a:lstStyle>
             <a:lvl1pPr defTabSz="455675">
@@ -17550,7 +17544,7 @@
         </p:spPr>
         <p:txBody>
           <a:bodyPr>
-            <a:normAutofit/>
+            <a:normAutofit fontScale="90000"/>
           </a:bodyPr>
           <a:lstStyle>
             <a:lvl1pPr defTabSz="403097">
@@ -17586,7 +17580,7 @@
           </a:ln>
           <a:extLst>
             <a:ext uri="{C572A759-6A51-4108-AA02-DFA0A04FC94B}">
-              <ma14:wrappingTextBoxFlag xmlns:ma14="http://schemas.microsoft.com/office/mac/drawingml/2011/main" xmlns="" val="1"/>
+              <ma14:wrappingTextBoxFlag xmlns="" xmlns:ma14="http://schemas.microsoft.com/office/mac/drawingml/2011/main" val="1"/>
             </a:ext>
           </a:extLst>
         </p:spPr>
@@ -17708,7 +17702,7 @@
         </p:spPr>
         <p:txBody>
           <a:bodyPr>
-            <a:normAutofit/>
+            <a:normAutofit fontScale="90000"/>
           </a:bodyPr>
           <a:lstStyle>
             <a:lvl1pPr defTabSz="403097">
@@ -17744,7 +17738,7 @@
           </a:ln>
           <a:extLst>
             <a:ext uri="{C572A759-6A51-4108-AA02-DFA0A04FC94B}">
-              <ma14:wrappingTextBoxFlag xmlns:ma14="http://schemas.microsoft.com/office/mac/drawingml/2011/main" xmlns="" val="1"/>
+              <ma14:wrappingTextBoxFlag xmlns="" xmlns:ma14="http://schemas.microsoft.com/office/mac/drawingml/2011/main" val="1"/>
             </a:ext>
           </a:extLst>
         </p:spPr>
@@ -17804,7 +17798,7 @@
           </a:ln>
           <a:extLst>
             <a:ext uri="{C572A759-6A51-4108-AA02-DFA0A04FC94B}">
-              <ma14:wrappingTextBoxFlag xmlns:ma14="http://schemas.microsoft.com/office/mac/drawingml/2011/main" xmlns="" val="1"/>
+              <ma14:wrappingTextBoxFlag xmlns="" xmlns:ma14="http://schemas.microsoft.com/office/mac/drawingml/2011/main" val="1"/>
             </a:ext>
           </a:extLst>
         </p:spPr>

</xml_diff>

<commit_message>
session 9 slide update
</commit_message>
<xml_diff>
--- a/Session09/Session9_Slides.pptx
+++ b/Session09/Session9_Slides.pptx
@@ -10616,7 +10616,7 @@
           </a:ln>
           <a:extLst>
             <a:ext uri="{C572A759-6A51-4108-AA02-DFA0A04FC94B}">
-              <ma14:wrappingTextBoxFlag xmlns:ma14="http://schemas.microsoft.com/office/mac/drawingml/2011/main" xmlns="" val="1"/>
+              <ma14:wrappingTextBoxFlag xmlns="" xmlns:ma14="http://schemas.microsoft.com/office/mac/drawingml/2011/main" val="1"/>
             </a:ext>
           </a:extLst>
         </p:spPr>
@@ -10655,7 +10655,7 @@
           </a:ln>
           <a:extLst>
             <a:ext uri="{C572A759-6A51-4108-AA02-DFA0A04FC94B}">
-              <ma14:wrappingTextBoxFlag xmlns:ma14="http://schemas.microsoft.com/office/mac/drawingml/2011/main" xmlns="" val="1"/>
+              <ma14:wrappingTextBoxFlag xmlns="" xmlns:ma14="http://schemas.microsoft.com/office/mac/drawingml/2011/main" val="1"/>
             </a:ext>
           </a:extLst>
         </p:spPr>
@@ -11719,7 +11719,7 @@
           </a:ln>
           <a:extLst>
             <a:ext uri="{C572A759-6A51-4108-AA02-DFA0A04FC94B}">
-              <ma14:wrappingTextBoxFlag xmlns="" xmlns:ma14="http://schemas.microsoft.com/office/mac/drawingml/2011/main" val="1"/>
+              <ma14:wrappingTextBoxFlag xmlns:ma14="http://schemas.microsoft.com/office/mac/drawingml/2011/main" xmlns="" val="1"/>
             </a:ext>
           </a:extLst>
         </p:spPr>
@@ -11758,7 +11758,7 @@
           </a:ln>
           <a:extLst>
             <a:ext uri="{C572A759-6A51-4108-AA02-DFA0A04FC94B}">
-              <ma14:wrappingTextBoxFlag xmlns="" xmlns:ma14="http://schemas.microsoft.com/office/mac/drawingml/2011/main" val="1"/>
+              <ma14:wrappingTextBoxFlag xmlns:ma14="http://schemas.microsoft.com/office/mac/drawingml/2011/main" xmlns="" val="1"/>
             </a:ext>
           </a:extLst>
         </p:spPr>
@@ -12853,7 +12853,7 @@
           </a:ln>
           <a:extLst>
             <a:ext uri="{C572A759-6A51-4108-AA02-DFA0A04FC94B}">
-              <ma14:wrappingTextBoxFlag xmlns="" xmlns:ma14="http://schemas.microsoft.com/office/mac/drawingml/2011/main" val="1"/>
+              <ma14:wrappingTextBoxFlag xmlns:ma14="http://schemas.microsoft.com/office/mac/drawingml/2011/main" xmlns="" val="1"/>
             </a:ext>
           </a:extLst>
         </p:spPr>
@@ -12964,7 +12964,7 @@
           </a:ln>
           <a:extLst>
             <a:ext uri="{C572A759-6A51-4108-AA02-DFA0A04FC94B}">
-              <ma14:wrappingTextBoxFlag xmlns="" xmlns:ma14="http://schemas.microsoft.com/office/mac/drawingml/2011/main" val="1"/>
+              <ma14:wrappingTextBoxFlag xmlns:ma14="http://schemas.microsoft.com/office/mac/drawingml/2011/main" xmlns="" val="1"/>
             </a:ext>
           </a:extLst>
         </p:spPr>
@@ -13199,7 +13199,7 @@
           </a:ln>
           <a:extLst>
             <a:ext uri="{C572A759-6A51-4108-AA02-DFA0A04FC94B}">
-              <ma14:wrappingTextBoxFlag xmlns="" xmlns:ma14="http://schemas.microsoft.com/office/mac/drawingml/2011/main" val="1"/>
+              <ma14:wrappingTextBoxFlag xmlns:ma14="http://schemas.microsoft.com/office/mac/drawingml/2011/main" xmlns="" val="1"/>
             </a:ext>
           </a:extLst>
         </p:spPr>
@@ -13261,7 +13261,7 @@
           </a:ln>
           <a:extLst>
             <a:ext uri="{C572A759-6A51-4108-AA02-DFA0A04FC94B}">
-              <ma14:wrappingTextBoxFlag xmlns="" xmlns:ma14="http://schemas.microsoft.com/office/mac/drawingml/2011/main" val="1"/>
+              <ma14:wrappingTextBoxFlag xmlns:ma14="http://schemas.microsoft.com/office/mac/drawingml/2011/main" xmlns="" val="1"/>
             </a:ext>
           </a:extLst>
         </p:spPr>
@@ -13328,7 +13328,7 @@
           </a:ln>
           <a:extLst>
             <a:ext uri="{C572A759-6A51-4108-AA02-DFA0A04FC94B}">
-              <ma14:wrappingTextBoxFlag xmlns="" xmlns:ma14="http://schemas.microsoft.com/office/mac/drawingml/2011/main" val="1"/>
+              <ma14:wrappingTextBoxFlag xmlns:ma14="http://schemas.microsoft.com/office/mac/drawingml/2011/main" xmlns="" val="1"/>
             </a:ext>
           </a:extLst>
         </p:spPr>
@@ -13395,7 +13395,7 @@
           </a:ln>
           <a:extLst>
             <a:ext uri="{C572A759-6A51-4108-AA02-DFA0A04FC94B}">
-              <ma14:wrappingTextBoxFlag xmlns="" xmlns:ma14="http://schemas.microsoft.com/office/mac/drawingml/2011/main" val="1"/>
+              <ma14:wrappingTextBoxFlag xmlns:ma14="http://schemas.microsoft.com/office/mac/drawingml/2011/main" xmlns="" val="1"/>
             </a:ext>
           </a:extLst>
         </p:spPr>
@@ -13524,7 +13524,7 @@
           </a:ln>
           <a:extLst>
             <a:ext uri="{C572A759-6A51-4108-AA02-DFA0A04FC94B}">
-              <ma14:wrappingTextBoxFlag xmlns="" xmlns:ma14="http://schemas.microsoft.com/office/mac/drawingml/2011/main" val="1"/>
+              <ma14:wrappingTextBoxFlag xmlns:ma14="http://schemas.microsoft.com/office/mac/drawingml/2011/main" xmlns="" val="1"/>
             </a:ext>
           </a:extLst>
         </p:spPr>
@@ -15169,7 +15169,7 @@
 </file>
 
 <file path=ppt/slides/slide21.xml><?xml version="1.0" encoding="utf-8"?>
-<p:sld xmlns:a="http://schemas.openxmlformats.org/drawingml/2006/main" xmlns:r="http://schemas.openxmlformats.org/officeDocument/2006/relationships" xmlns:p="http://schemas.openxmlformats.org/presentationml/2006/main">
+<p:sld xmlns:a="http://schemas.openxmlformats.org/drawingml/2006/main" xmlns:r="http://schemas.openxmlformats.org/officeDocument/2006/relationships" xmlns:p="http://schemas.openxmlformats.org/presentationml/2006/main" show="0">
   <p:cSld>
     <p:spTree>
       <p:nvGrpSpPr>
@@ -15290,7 +15290,7 @@
 </file>
 
 <file path=ppt/slides/slide22.xml><?xml version="1.0" encoding="utf-8"?>
-<p:sld xmlns:a="http://schemas.openxmlformats.org/drawingml/2006/main" xmlns:r="http://schemas.openxmlformats.org/officeDocument/2006/relationships" xmlns:p="http://schemas.openxmlformats.org/presentationml/2006/main">
+<p:sld xmlns:a="http://schemas.openxmlformats.org/drawingml/2006/main" xmlns:r="http://schemas.openxmlformats.org/officeDocument/2006/relationships" xmlns:p="http://schemas.openxmlformats.org/presentationml/2006/main" show="0">
   <p:cSld>
     <p:spTree>
       <p:nvGrpSpPr>
@@ -15420,7 +15420,7 @@
 </file>
 
 <file path=ppt/slides/slide23.xml><?xml version="1.0" encoding="utf-8"?>
-<p:sld xmlns:a="http://schemas.openxmlformats.org/drawingml/2006/main" xmlns:r="http://schemas.openxmlformats.org/officeDocument/2006/relationships" xmlns:p="http://schemas.openxmlformats.org/presentationml/2006/main">
+<p:sld xmlns:a="http://schemas.openxmlformats.org/drawingml/2006/main" xmlns:r="http://schemas.openxmlformats.org/officeDocument/2006/relationships" xmlns:p="http://schemas.openxmlformats.org/presentationml/2006/main" show="0">
   <p:cSld>
     <p:spTree>
       <p:nvGrpSpPr>
@@ -15544,7 +15544,7 @@
           </a:ln>
           <a:extLst>
             <a:ext uri="{C572A759-6A51-4108-AA02-DFA0A04FC94B}">
-              <ma14:wrappingTextBoxFlag xmlns="" xmlns:ma14="http://schemas.microsoft.com/office/mac/drawingml/2011/main" val="1"/>
+              <ma14:wrappingTextBoxFlag xmlns:ma14="http://schemas.microsoft.com/office/mac/drawingml/2011/main" xmlns="" val="1"/>
             </a:ext>
           </a:extLst>
         </p:spPr>
@@ -17010,7 +17010,7 @@
           </a:ln>
           <a:extLst>
             <a:ext uri="{C572A759-6A51-4108-AA02-DFA0A04FC94B}">
-              <ma14:wrappingTextBoxFlag xmlns="" xmlns:ma14="http://schemas.microsoft.com/office/mac/drawingml/2011/main" val="1"/>
+              <ma14:wrappingTextBoxFlag xmlns:ma14="http://schemas.microsoft.com/office/mac/drawingml/2011/main" xmlns="" val="1"/>
             </a:ext>
           </a:extLst>
         </p:spPr>
@@ -17054,7 +17054,7 @@
           </a:ln>
           <a:extLst>
             <a:ext uri="{C572A759-6A51-4108-AA02-DFA0A04FC94B}">
-              <ma14:wrappingTextBoxFlag xmlns="" xmlns:ma14="http://schemas.microsoft.com/office/mac/drawingml/2011/main" val="1"/>
+              <ma14:wrappingTextBoxFlag xmlns:ma14="http://schemas.microsoft.com/office/mac/drawingml/2011/main" xmlns="" val="1"/>
             </a:ext>
           </a:extLst>
         </p:spPr>
@@ -17268,7 +17268,7 @@
           </a:ln>
           <a:extLst>
             <a:ext uri="{C572A759-6A51-4108-AA02-DFA0A04FC94B}">
-              <ma14:wrappingTextBoxFlag xmlns="" xmlns:ma14="http://schemas.microsoft.com/office/mac/drawingml/2011/main" val="1"/>
+              <ma14:wrappingTextBoxFlag xmlns:ma14="http://schemas.microsoft.com/office/mac/drawingml/2011/main" xmlns="" val="1"/>
             </a:ext>
           </a:extLst>
         </p:spPr>
@@ -17386,7 +17386,7 @@
           </a:ln>
           <a:extLst>
             <a:ext uri="{C572A759-6A51-4108-AA02-DFA0A04FC94B}">
-              <ma14:wrappingTextBoxFlag xmlns="" xmlns:ma14="http://schemas.microsoft.com/office/mac/drawingml/2011/main" val="1"/>
+              <ma14:wrappingTextBoxFlag xmlns:ma14="http://schemas.microsoft.com/office/mac/drawingml/2011/main" xmlns="" val="1"/>
             </a:ext>
           </a:extLst>
         </p:spPr>
@@ -17580,7 +17580,7 @@
           </a:ln>
           <a:extLst>
             <a:ext uri="{C572A759-6A51-4108-AA02-DFA0A04FC94B}">
-              <ma14:wrappingTextBoxFlag xmlns="" xmlns:ma14="http://schemas.microsoft.com/office/mac/drawingml/2011/main" val="1"/>
+              <ma14:wrappingTextBoxFlag xmlns:ma14="http://schemas.microsoft.com/office/mac/drawingml/2011/main" xmlns="" val="1"/>
             </a:ext>
           </a:extLst>
         </p:spPr>
@@ -17738,7 +17738,7 @@
           </a:ln>
           <a:extLst>
             <a:ext uri="{C572A759-6A51-4108-AA02-DFA0A04FC94B}">
-              <ma14:wrappingTextBoxFlag xmlns="" xmlns:ma14="http://schemas.microsoft.com/office/mac/drawingml/2011/main" val="1"/>
+              <ma14:wrappingTextBoxFlag xmlns:ma14="http://schemas.microsoft.com/office/mac/drawingml/2011/main" xmlns="" val="1"/>
             </a:ext>
           </a:extLst>
         </p:spPr>
@@ -17798,7 +17798,7 @@
           </a:ln>
           <a:extLst>
             <a:ext uri="{C572A759-6A51-4108-AA02-DFA0A04FC94B}">
-              <ma14:wrappingTextBoxFlag xmlns="" xmlns:ma14="http://schemas.microsoft.com/office/mac/drawingml/2011/main" val="1"/>
+              <ma14:wrappingTextBoxFlag xmlns:ma14="http://schemas.microsoft.com/office/mac/drawingml/2011/main" xmlns="" val="1"/>
             </a:ext>
           </a:extLst>
         </p:spPr>

</xml_diff>